<commit_message>
Update Apply ML to Music Streaming Data.pptx
</commit_message>
<xml_diff>
--- a/Apply ML to Music Streaming Data.pptx
+++ b/Apply ML to Music Streaming Data.pptx
@@ -5,7 +5,7 @@
     <p:sldMasterId id="2147483874" r:id="rId1"/>
   </p:sldMasterIdLst>
   <p:notesMasterIdLst>
-    <p:notesMasterId r:id="rId19"/>
+    <p:notesMasterId r:id="rId20"/>
   </p:notesMasterIdLst>
   <p:sldIdLst>
     <p:sldId id="266" r:id="rId2"/>
@@ -21,10 +21,11 @@
     <p:sldId id="273" r:id="rId12"/>
     <p:sldId id="274" r:id="rId13"/>
     <p:sldId id="276" r:id="rId14"/>
-    <p:sldId id="279" r:id="rId15"/>
-    <p:sldId id="278" r:id="rId16"/>
-    <p:sldId id="280" r:id="rId17"/>
-    <p:sldId id="281" r:id="rId18"/>
+    <p:sldId id="282" r:id="rId15"/>
+    <p:sldId id="283" r:id="rId16"/>
+    <p:sldId id="284" r:id="rId17"/>
+    <p:sldId id="280" r:id="rId18"/>
+    <p:sldId id="281" r:id="rId19"/>
   </p:sldIdLst>
   <p:sldSz cx="12192000" cy="6858000"/>
   <p:notesSz cx="6858000" cy="9144000"/>
@@ -124,8 +125,11 @@
     </a:lvl9pPr>
   </p:defaultTextStyle>
   <p:extLst>
+    <p:ext uri="{EFAFB233-063F-42B5-8137-9DF3F51BA10A}">
+      <p15:sldGuideLst xmlns:p15="http://schemas.microsoft.com/office/powerpoint/2012/main"/>
+    </p:ext>
     <p:ext uri="GoogleSlidesCustomDataVersion2">
-      <go:slidesCustomData xmlns:go="http://customooxmlschemas.google.com/" xmlns:ahyp="http://schemas.microsoft.com/office/drawing/2018/hyperlinkcolor" xmlns:p15="http://schemas.microsoft.com/office/powerpoint/2012/main" xmlns:p14="http://schemas.microsoft.com/office/powerpoint/2010/main" xmlns:com="http://schemas.openxmlformats.org/drawingml/2006/compatibility" xmlns:pvml="urn:schemas-microsoft-com:office:powerpoint" xmlns:v="urn:schemas-microsoft-com:vml" xmlns:o="urn:schemas-microsoft-com:office:office" xmlns:dgm="http://schemas.openxmlformats.org/drawingml/2006/diagram" xmlns:c="http://schemas.openxmlformats.org/drawingml/2006/chart" xmlns:mv="urn:schemas-microsoft-com:mac:vml" xmlns:mc="http://schemas.openxmlformats.org/markup-compatibility/2006" xmlns="" r:id="rId20" roundtripDataSignature="AMtx7miv93a0sd/AWvO8qWagH3fq+oT7FQ=="/>
+      <go:slidesCustomData xmlns="" xmlns:mc="http://schemas.openxmlformats.org/markup-compatibility/2006" xmlns:mv="urn:schemas-microsoft-com:mac:vml" xmlns:c="http://schemas.openxmlformats.org/drawingml/2006/chart" xmlns:dgm="http://schemas.openxmlformats.org/drawingml/2006/diagram" xmlns:o="urn:schemas-microsoft-com:office:office" xmlns:v="urn:schemas-microsoft-com:vml" xmlns:pvml="urn:schemas-microsoft-com:office:powerpoint" xmlns:com="http://schemas.openxmlformats.org/drawingml/2006/compatibility" xmlns:p14="http://schemas.microsoft.com/office/powerpoint/2010/main" xmlns:p15="http://schemas.microsoft.com/office/powerpoint/2012/main" xmlns:ahyp="http://schemas.microsoft.com/office/drawing/2018/hyperlinkcolor" xmlns:go="http://customooxmlschemas.google.com/" r:id="rId21" roundtripDataSignature="AMtx7miv93a0sd/AWvO8qWagH3fq+oT7FQ=="/>
     </p:ext>
   </p:extLst>
 </p:presentation>
@@ -24978,7 +24982,7 @@
             </a:pPr>
             <a:r>
               <a:rPr lang="en-US" sz="1800" i="1" dirty="0"/>
-              <a:t>Initial model: 72.8%</a:t>
+              <a:t>Initial model: ~ 72.74%</a:t>
             </a:r>
           </a:p>
           <a:p>
@@ -24988,7 +24992,7 @@
             </a:pPr>
             <a:r>
               <a:rPr lang="en-US" sz="1800" i="1" dirty="0"/>
-              <a:t>Retrained model: 71.74%</a:t>
+              <a:t>Retrained model: ~ 71.60%</a:t>
             </a:r>
           </a:p>
           <a:p>
@@ -25108,7 +25112,7 @@
         <p:spPr>
           <a:xfrm>
             <a:off x="6096000" y="1643319"/>
-            <a:ext cx="4623637" cy="2765929"/>
+            <a:ext cx="4623637" cy="2937492"/>
           </a:xfrm>
           <a:prstGeom prst="rect">
             <a:avLst/>
@@ -25116,7 +25120,7 @@
         </p:spPr>
         <p:txBody>
           <a:bodyPr vert="horz" lIns="45720" tIns="45720" rIns="45720" bIns="45720" rtlCol="0">
-            <a:normAutofit/>
+            <a:normAutofit lnSpcReduction="10000"/>
           </a:bodyPr>
           <a:lstStyle>
             <a:lvl1pPr marL="91440" indent="-91440" algn="l" defTabSz="914400" rtl="0" eaLnBrk="1" latinLnBrk="0" hangingPunct="1">
@@ -25360,7 +25364,7 @@
             </a:pPr>
             <a:r>
               <a:rPr lang="en-US" sz="1800" i="1" dirty="0"/>
-              <a:t>Initial model: 77.16%</a:t>
+              <a:t>Initial model: ~ 77.16%</a:t>
             </a:r>
           </a:p>
           <a:p>
@@ -25370,7 +25374,7 @@
             </a:pPr>
             <a:r>
               <a:rPr lang="en-US" sz="1800" i="1" dirty="0"/>
-              <a:t>Optimized model: 77.54%</a:t>
+              <a:t>Optimized model: ~ 77.25%</a:t>
             </a:r>
           </a:p>
           <a:p>
@@ -25416,7 +25420,10 @@
               <a:buFont typeface="Arial" panose="020B0604020202020204" pitchFamily="34" charset="0"/>
               <a:buChar char="•"/>
             </a:pPr>
-            <a:endParaRPr lang="en-US" sz="1800" i="1" dirty="0"/>
+            <a:r>
+              <a:rPr lang="en-US" sz="1800" i="1" dirty="0"/>
+              <a:t>Learning Curve Plot</a:t>
+            </a:r>
           </a:p>
           <a:p>
             <a:endParaRPr lang="en-US" b="1" dirty="0">
@@ -25525,7 +25532,7 @@
         </p:blipFill>
         <p:spPr>
           <a:xfrm>
-            <a:off x="6213743" y="4409248"/>
+            <a:off x="6213743" y="4430514"/>
             <a:ext cx="2299413" cy="1940433"/>
           </a:xfrm>
           <a:prstGeom prst="rect">
@@ -25560,7 +25567,7 @@
         </p:blipFill>
         <p:spPr>
           <a:xfrm>
-            <a:off x="8593421" y="4580811"/>
+            <a:off x="8593421" y="4602077"/>
             <a:ext cx="2401043" cy="1597304"/>
           </a:xfrm>
           <a:prstGeom prst="rect">
@@ -25576,7 +25583,7 @@
     </p:spTree>
     <p:extLst>
       <p:ext uri="{BB962C8B-B14F-4D97-AF65-F5344CB8AC3E}">
-        <p14:creationId xmlns:p14="http://schemas.microsoft.com/office/powerpoint/2010/main" val="4061875280"/>
+        <p14:creationId xmlns:p14="http://schemas.microsoft.com/office/powerpoint/2010/main" val="2464868494"/>
       </p:ext>
     </p:extLst>
   </p:cSld>
@@ -25691,7 +25698,7 @@
             </a:pPr>
             <a:r>
               <a:rPr lang="en-US" sz="1800" i="1" dirty="0"/>
-              <a:t>71.71%</a:t>
+              <a:t>~ 72.52%</a:t>
             </a:r>
           </a:p>
           <a:p>
@@ -25808,8 +25815,8 @@
         </p:nvSpPr>
         <p:spPr>
           <a:xfrm>
-            <a:off x="6096000" y="1645918"/>
-            <a:ext cx="4511040" cy="3444599"/>
+            <a:off x="6096000" y="1645919"/>
+            <a:ext cx="4511040" cy="2923817"/>
           </a:xfrm>
           <a:prstGeom prst="rect">
             <a:avLst/>
@@ -25817,7 +25824,7 @@
         </p:spPr>
         <p:txBody>
           <a:bodyPr vert="horz" lIns="45720" tIns="45720" rIns="45720" bIns="45720" rtlCol="0">
-            <a:normAutofit/>
+            <a:normAutofit lnSpcReduction="10000"/>
           </a:bodyPr>
           <a:lstStyle>
             <a:lvl1pPr marL="91440" indent="-91440" algn="l" defTabSz="914400" rtl="0" eaLnBrk="1" latinLnBrk="0" hangingPunct="1">
@@ -26061,7 +26068,7 @@
             </a:pPr>
             <a:r>
               <a:rPr lang="en-US" sz="1800" i="1" dirty="0"/>
-              <a:t>Initial model: 77.44%</a:t>
+              <a:t>Initial model: ~ 77.17%</a:t>
             </a:r>
           </a:p>
           <a:p>
@@ -26071,7 +26078,7 @@
             </a:pPr>
             <a:r>
               <a:rPr lang="en-US" sz="1800" i="1" dirty="0"/>
-              <a:t>Optimized model: 77.62% (Highest)</a:t>
+              <a:t>Optimized model: ~ 78.08% (Highest)</a:t>
             </a:r>
           </a:p>
           <a:p>
@@ -26111,6 +26118,30 @@
               <a:rPr lang="en-US" sz="1800" i="1" dirty="0"/>
               <a:t>Precision and Recall</a:t>
             </a:r>
+          </a:p>
+          <a:p>
+            <a:pPr lvl="2">
+              <a:buFont typeface="Arial" panose="020B0604020202020204" pitchFamily="34" charset="0"/>
+              <a:buChar char="•"/>
+            </a:pPr>
+            <a:r>
+              <a:rPr lang="en-US" sz="1800" i="1" dirty="0"/>
+              <a:t>Learning Curve Plot (see slide 16)</a:t>
+            </a:r>
+          </a:p>
+          <a:p>
+            <a:pPr lvl="2">
+              <a:buFont typeface="Arial" panose="020B0604020202020204" pitchFamily="34" charset="0"/>
+              <a:buChar char="•"/>
+            </a:pPr>
+            <a:endParaRPr lang="en-US" sz="1800" i="1" dirty="0"/>
+          </a:p>
+          <a:p>
+            <a:pPr lvl="2">
+              <a:buFont typeface="Arial" panose="020B0604020202020204" pitchFamily="34" charset="0"/>
+              <a:buChar char="•"/>
+            </a:pPr>
+            <a:endParaRPr lang="en-US" sz="1800" i="1" dirty="0"/>
           </a:p>
           <a:p>
             <a:endParaRPr lang="en-US" b="1" dirty="0">
@@ -26144,7 +26175,7 @@
         </p:blipFill>
         <p:spPr>
           <a:xfrm>
-            <a:off x="438731" y="4445058"/>
+            <a:off x="438731" y="4423792"/>
             <a:ext cx="2244637" cy="1919819"/>
           </a:xfrm>
           <a:prstGeom prst="rect">
@@ -26179,7 +26210,7 @@
         </p:blipFill>
         <p:spPr>
           <a:xfrm>
-            <a:off x="2786792" y="4569736"/>
+            <a:off x="2786792" y="4548470"/>
             <a:ext cx="2451620" cy="1644958"/>
           </a:xfrm>
           <a:prstGeom prst="rect">
@@ -26265,7 +26296,7 @@
     </p:spTree>
     <p:extLst>
       <p:ext uri="{BB962C8B-B14F-4D97-AF65-F5344CB8AC3E}">
-        <p14:creationId xmlns:p14="http://schemas.microsoft.com/office/powerpoint/2010/main" val="3506572631"/>
+        <p14:creationId xmlns:p14="http://schemas.microsoft.com/office/powerpoint/2010/main" val="1333218372"/>
       </p:ext>
     </p:extLst>
   </p:cSld>
@@ -26276,6 +26307,254 @@
 </file>
 
 <file path=ppt/slides/slide16.xml><?xml version="1.0" encoding="utf-8"?>
+<p:sld xmlns:a="http://schemas.openxmlformats.org/drawingml/2006/main" xmlns:r="http://schemas.openxmlformats.org/officeDocument/2006/relationships" xmlns:p="http://schemas.openxmlformats.org/presentationml/2006/main">
+  <p:cSld>
+    <p:spTree>
+      <p:nvGrpSpPr>
+        <p:cNvPr id="1" name=""/>
+        <p:cNvGrpSpPr/>
+        <p:nvPr/>
+      </p:nvGrpSpPr>
+      <p:grpSpPr>
+        <a:xfrm>
+          <a:off x="0" y="0"/>
+          <a:ext cx="0" cy="0"/>
+          <a:chOff x="0" y="0"/>
+          <a:chExt cx="0" cy="0"/>
+        </a:xfrm>
+      </p:grpSpPr>
+      <p:sp>
+        <p:nvSpPr>
+          <p:cNvPr id="2" name="Title 1">
+            <a:extLst>
+              <a:ext uri="{FF2B5EF4-FFF2-40B4-BE49-F238E27FC236}">
+                <a16:creationId xmlns:a16="http://schemas.microsoft.com/office/drawing/2014/main" id="{C7DBF3D9-3FAC-EDB3-DBD5-47EA30760EEC}"/>
+              </a:ext>
+            </a:extLst>
+          </p:cNvPr>
+          <p:cNvSpPr>
+            <a:spLocks noGrp="1"/>
+          </p:cNvSpPr>
+          <p:nvPr>
+            <p:ph type="title"/>
+          </p:nvPr>
+        </p:nvSpPr>
+        <p:spPr>
+          <a:xfrm>
+            <a:off x="1024128" y="606732"/>
+            <a:ext cx="9012757" cy="1125250"/>
+          </a:xfrm>
+        </p:spPr>
+        <p:txBody>
+          <a:bodyPr>
+            <a:normAutofit/>
+          </a:bodyPr>
+          <a:lstStyle/>
+          <a:p>
+            <a:r>
+              <a:rPr lang="en-US" sz="5400" dirty="0">
+                <a:cs typeface="Calibri" panose="020F0502020204030204" pitchFamily="34" charset="0"/>
+              </a:rPr>
+              <a:t>Results and Observations (Cont.)</a:t>
+            </a:r>
+            <a:endParaRPr lang="en-US" sz="5400" dirty="0"/>
+          </a:p>
+        </p:txBody>
+      </p:sp>
+      <p:sp>
+        <p:nvSpPr>
+          <p:cNvPr id="3" name="Content Placeholder 2">
+            <a:extLst>
+              <a:ext uri="{FF2B5EF4-FFF2-40B4-BE49-F238E27FC236}">
+                <a16:creationId xmlns:a16="http://schemas.microsoft.com/office/drawing/2014/main" id="{EFB3E774-4BD2-76F7-56C1-031FD98058F5}"/>
+              </a:ext>
+            </a:extLst>
+          </p:cNvPr>
+          <p:cNvSpPr>
+            <a:spLocks noGrp="1"/>
+          </p:cNvSpPr>
+          <p:nvPr>
+            <p:ph idx="1"/>
+          </p:nvPr>
+        </p:nvSpPr>
+        <p:spPr>
+          <a:xfrm>
+            <a:off x="1024128" y="2162287"/>
+            <a:ext cx="4322424" cy="4128246"/>
+          </a:xfrm>
+        </p:spPr>
+        <p:txBody>
+          <a:bodyPr>
+            <a:normAutofit/>
+          </a:bodyPr>
+          <a:lstStyle/>
+          <a:p>
+            <a:r>
+              <a:rPr lang="en-US" b="1" dirty="0"/>
+              <a:t>Learning Curve of the Optimized XGBoost Model</a:t>
+            </a:r>
+          </a:p>
+          <a:p>
+            <a:pPr>
+              <a:buFont typeface="Wingdings" pitchFamily="2" charset="2"/>
+              <a:buChar char="v"/>
+            </a:pPr>
+            <a:r>
+              <a:rPr lang="en-US" dirty="0"/>
+              <a:t> Limitation:</a:t>
+            </a:r>
+          </a:p>
+          <a:p>
+            <a:pPr lvl="2">
+              <a:buFont typeface="Arial" panose="020B0604020202020204" pitchFamily="34" charset="0"/>
+              <a:buChar char="•"/>
+            </a:pPr>
+            <a:r>
+              <a:rPr lang="en-US" sz="2000" i="1" dirty="0"/>
+              <a:t>A complex model requires a larger amount of data to start generalizing well. </a:t>
+            </a:r>
+          </a:p>
+          <a:p>
+            <a:pPr lvl="2">
+              <a:buFont typeface="Arial" panose="020B0604020202020204" pitchFamily="34" charset="0"/>
+              <a:buChar char="•"/>
+            </a:pPr>
+            <a:r>
+              <a:rPr lang="en-US" sz="1800" i="1" dirty="0"/>
+              <a:t>The</a:t>
+            </a:r>
+            <a:r>
+              <a:rPr lang="en-US" sz="2000" i="1" dirty="0"/>
+              <a:t> training score and the cross-validation score have a trend to converge if more training data is available, which indicates the model may generalize better with a larger dataset.</a:t>
+            </a:r>
+          </a:p>
+          <a:p>
+            <a:endParaRPr lang="en-US" b="1" dirty="0"/>
+          </a:p>
+          <a:p>
+            <a:pPr marL="0" indent="0">
+              <a:buNone/>
+            </a:pPr>
+            <a:endParaRPr lang="en-US" b="1" i="0" dirty="0">
+              <a:effectLst/>
+              <a:latin typeface="system-ui"/>
+            </a:endParaRPr>
+          </a:p>
+          <a:p>
+            <a:endParaRPr lang="en-US" b="1" i="0" dirty="0">
+              <a:effectLst/>
+              <a:latin typeface="system-ui"/>
+            </a:endParaRPr>
+          </a:p>
+          <a:p>
+            <a:endParaRPr lang="en-US" b="1" i="0" dirty="0">
+              <a:effectLst/>
+              <a:latin typeface="system-ui"/>
+            </a:endParaRPr>
+          </a:p>
+          <a:p>
+            <a:endParaRPr lang="en-US" dirty="0"/>
+          </a:p>
+        </p:txBody>
+      </p:sp>
+      <p:pic>
+        <p:nvPicPr>
+          <p:cNvPr id="10" name="Picture 9" descr="A graph of a graph with numbers and lines&#10;&#10;Description automatically generated with medium confidence">
+            <a:extLst>
+              <a:ext uri="{FF2B5EF4-FFF2-40B4-BE49-F238E27FC236}">
+                <a16:creationId xmlns:a16="http://schemas.microsoft.com/office/drawing/2014/main" id="{395FABB0-F36E-C915-B50D-10A9D8003477}"/>
+              </a:ext>
+            </a:extLst>
+          </p:cNvPr>
+          <p:cNvPicPr>
+            <a:picLocks noChangeAspect="1"/>
+          </p:cNvPicPr>
+          <p:nvPr/>
+        </p:nvPicPr>
+        <p:blipFill>
+          <a:blip r:embed="rId2"/>
+          <a:stretch>
+            <a:fillRect/>
+          </a:stretch>
+        </p:blipFill>
+        <p:spPr>
+          <a:xfrm>
+            <a:off x="5669279" y="1896954"/>
+            <a:ext cx="5904157" cy="4354314"/>
+          </a:xfrm>
+          <a:prstGeom prst="rect">
+            <a:avLst/>
+          </a:prstGeom>
+        </p:spPr>
+      </p:pic>
+      <p:sp>
+        <p:nvSpPr>
+          <p:cNvPr id="4" name="Slide Number Placeholder 3">
+            <a:extLst>
+              <a:ext uri="{FF2B5EF4-FFF2-40B4-BE49-F238E27FC236}">
+                <a16:creationId xmlns:a16="http://schemas.microsoft.com/office/drawing/2014/main" id="{AE79CD75-B7B8-F6D5-FFCE-7D34CDDE3249}"/>
+              </a:ext>
+            </a:extLst>
+          </p:cNvPr>
+          <p:cNvSpPr>
+            <a:spLocks noGrp="1"/>
+          </p:cNvSpPr>
+          <p:nvPr>
+            <p:ph type="sldNum" sz="quarter" idx="12"/>
+          </p:nvPr>
+        </p:nvSpPr>
+        <p:spPr>
+          <a:xfrm>
+            <a:off x="10837333" y="6470704"/>
+            <a:ext cx="973667" cy="274320"/>
+          </a:xfrm>
+        </p:spPr>
+        <p:txBody>
+          <a:bodyPr>
+            <a:normAutofit/>
+          </a:bodyPr>
+          <a:lstStyle/>
+          <a:p>
+            <a:pPr marL="0" lvl="0" indent="0" rtl="0">
+              <a:spcBef>
+                <a:spcPts val="0"/>
+              </a:spcBef>
+              <a:spcAft>
+                <a:spcPts val="600"/>
+              </a:spcAft>
+              <a:buNone/>
+            </a:pPr>
+            <a:fld id="{00000000-1234-1234-1234-123412341234}" type="slidenum">
+              <a:rPr lang="en-US" smtClean="0"/>
+              <a:pPr marL="0" lvl="0" indent="0" rtl="0">
+                <a:spcBef>
+                  <a:spcPts val="0"/>
+                </a:spcBef>
+                <a:spcAft>
+                  <a:spcPts val="600"/>
+                </a:spcAft>
+                <a:buNone/>
+              </a:pPr>
+              <a:t>16</a:t>
+            </a:fld>
+            <a:endParaRPr lang="en-US"/>
+          </a:p>
+        </p:txBody>
+      </p:sp>
+    </p:spTree>
+    <p:extLst>
+      <p:ext uri="{BB962C8B-B14F-4D97-AF65-F5344CB8AC3E}">
+        <p14:creationId xmlns:p14="http://schemas.microsoft.com/office/powerpoint/2010/main" val="2071672617"/>
+      </p:ext>
+    </p:extLst>
+  </p:cSld>
+  <p:clrMapOvr>
+    <a:masterClrMapping/>
+  </p:clrMapOvr>
+</p:sld>
+</file>
+
+<file path=ppt/slides/slide17.xml><?xml version="1.0" encoding="utf-8"?>
 <p:sld xmlns:a="http://schemas.openxmlformats.org/drawingml/2006/main" xmlns:r="http://schemas.openxmlformats.org/officeDocument/2006/relationships" xmlns:p="http://schemas.openxmlformats.org/presentationml/2006/main">
   <p:cSld>
     <p:spTree>
@@ -26371,7 +26650,7 @@
             </a:pPr>
             <a:fld id="{00000000-1234-1234-1234-123412341234}" type="slidenum">
               <a:rPr lang="en-US" smtClean="0"/>
-              <a:t>16</a:t>
+              <a:t>17</a:t>
             </a:fld>
             <a:endParaRPr lang="en-US"/>
           </a:p>
@@ -26406,8 +26685,12 @@
           <a:lstStyle/>
           <a:p>
             <a:r>
+              <a:rPr lang="en-US" sz="2800"/>
+              <a:t>Try the other </a:t>
+            </a:r>
+            <a:r>
               <a:rPr lang="en-US" sz="2800" dirty="0"/>
-              <a:t>Try other models</a:t>
+              <a:t>models</a:t>
             </a:r>
           </a:p>
           <a:p>
@@ -26523,7 +26806,7 @@
 </p:sld>
 </file>
 
-<file path=ppt/slides/slide17.xml><?xml version="1.0" encoding="utf-8"?>
+<file path=ppt/slides/slide18.xml><?xml version="1.0" encoding="utf-8"?>
 <p:sld xmlns:a="http://schemas.openxmlformats.org/drawingml/2006/main" xmlns:r="http://schemas.openxmlformats.org/officeDocument/2006/relationships" xmlns:p="http://schemas.openxmlformats.org/presentationml/2006/main">
   <p:cSld>
     <p:spTree>
@@ -26616,7 +26899,7 @@
             </a:pPr>
             <a:fld id="{00000000-1234-1234-1234-123412341234}" type="slidenum">
               <a:rPr lang="en-US" smtClean="0"/>
-              <a:t>17</a:t>
+              <a:t>18</a:t>
             </a:fld>
             <a:endParaRPr lang="en-US"/>
           </a:p>

</xml_diff>